<commit_message>
Fix results, write discussion, write limitations
</commit_message>
<xml_diff>
--- a/mode_choice_thesis_8-26-22.pptx
+++ b/mode_choice_thesis_8-26-22.pptx
@@ -738,7 +738,7 @@
           <a:p>
             <a:fld id="{9C903A87-2269-EE4A-AAA2-349CEE4A908A}" type="datetimeFigureOut">
               <a:rPr lang="en-US" smtClean="0"/>
-              <a:t>8/27/2022</a:t>
+              <a:t>8/29/2022</a:t>
             </a:fld>
             <a:endParaRPr lang="en-US"/>
           </a:p>
@@ -904,7 +904,7 @@
           <a:p>
             <a:fld id="{9C903A87-2269-EE4A-AAA2-349CEE4A908A}" type="datetimeFigureOut">
               <a:rPr lang="en-US" smtClean="0"/>
-              <a:t>8/27/2022</a:t>
+              <a:t>8/29/2022</a:t>
             </a:fld>
             <a:endParaRPr lang="en-US"/>
           </a:p>
@@ -1241,7 +1241,7 @@
           <a:p>
             <a:fld id="{9C903A87-2269-EE4A-AAA2-349CEE4A908A}" type="datetimeFigureOut">
               <a:rPr lang="en-US" smtClean="0"/>
-              <a:t>8/27/2022</a:t>
+              <a:t>8/29/2022</a:t>
             </a:fld>
             <a:endParaRPr lang="en-US"/>
           </a:p>
@@ -2718,7 +2718,7 @@
           <a:p>
             <a:fld id="{9C903A87-2269-EE4A-AAA2-349CEE4A908A}" type="datetimeFigureOut">
               <a:rPr lang="en-US" smtClean="0"/>
-              <a:t>8/27/2022</a:t>
+              <a:t>8/29/2022</a:t>
             </a:fld>
             <a:endParaRPr lang="en-US"/>
           </a:p>
@@ -4123,7 +4123,7 @@
           <a:p>
             <a:fld id="{9C903A87-2269-EE4A-AAA2-349CEE4A908A}" type="datetimeFigureOut">
               <a:rPr lang="en-US" smtClean="0"/>
-              <a:t>8/27/2022</a:t>
+              <a:t>8/29/2022</a:t>
             </a:fld>
             <a:endParaRPr lang="en-US"/>
           </a:p>
@@ -4376,7 +4376,7 @@
           <a:p>
             <a:fld id="{9C903A87-2269-EE4A-AAA2-349CEE4A908A}" type="datetimeFigureOut">
               <a:rPr lang="en-US" smtClean="0"/>
-              <a:t>8/27/2022</a:t>
+              <a:t>8/29/2022</a:t>
             </a:fld>
             <a:endParaRPr lang="en-US"/>
           </a:p>
@@ -4667,7 +4667,7 @@
           <a:p>
             <a:fld id="{9C903A87-2269-EE4A-AAA2-349CEE4A908A}" type="datetimeFigureOut">
               <a:rPr lang="en-US" smtClean="0"/>
-              <a:t>8/27/2022</a:t>
+              <a:t>8/29/2022</a:t>
             </a:fld>
             <a:endParaRPr lang="en-US"/>
           </a:p>
@@ -6098,7 +6098,7 @@
                   <a:schemeClr val="bg1"/>
                 </a:solidFill>
               </a:rPr>
-              <a:t>Division of agents who switch from one mode toa ride hail modes</a:t>
+              <a:t>Division of agents who switch from one mode to ride hail modes</a:t>
             </a:r>
           </a:p>
           <a:p>

</xml_diff>